<commit_message>
ppt de lições aprendidas
</commit_message>
<xml_diff>
--- a/20250205_LicoesAprendidas/Grupo4_LicoesAprendidas.pptx
+++ b/20250205_LicoesAprendidas/Grupo4_LicoesAprendidas.pptx
@@ -11991,8 +11991,8 @@
         </p:nvSpPr>
         <p:spPr>
           <a:xfrm>
-            <a:off x="9448800" y="6451600"/>
-            <a:ext cx="2743200" cy="365125"/>
+            <a:off x="90055" y="6333834"/>
+            <a:ext cx="12010904" cy="365125"/>
           </a:xfrm>
           <a:prstGeom prst="rect">
             <a:avLst/>
@@ -12002,12 +12002,15 @@
           <a:bodyPr/>
           <a:lstStyle/>
           <a:p>
-            <a:fld id="{BC7BA7F7-9ECA-4650-BA2A-F44574574266}" type="slidenum">
-              <a:rPr lang="pt-BR" smtClean="0"/>
-              <a:pPr/>
-              <a:t>4</a:t>
-            </a:fld>
-            <a:endParaRPr lang="pt-BR"/>
+            <a:pPr algn="ctr"/>
+            <a:r>
+              <a:rPr lang="pt-BR" sz="1200" b="1" dirty="0"/>
+              <a:t>GRUPO 4</a:t>
+            </a:r>
+            <a:r>
+              <a:rPr lang="pt-BR" sz="1200" dirty="0"/>
+              <a:t> – DANIEL SENA – GUSTAVO OLIVEIRA – LEANDRO BONETO – MIKKI DOS ANJOS – RODRIGO OLIVARES – SHELLY NADUDVARI</a:t>
+            </a:r>
           </a:p>
         </p:txBody>
       </p:sp>
@@ -12361,56 +12364,6 @@
           </a:p>
         </p:txBody>
       </p:sp>
-      <p:pic>
-        <p:nvPicPr>
-          <p:cNvPr id="65" name="Picture 4" descr="Resultado de imagem para icone voltar">
-            <a:hlinkClick r:id="" action="ppaction://noaction"/>
-          </p:cNvPr>
-          <p:cNvPicPr>
-            <a:picLocks noChangeAspect="1" noChangeArrowheads="1"/>
-          </p:cNvPicPr>
-          <p:nvPr/>
-        </p:nvPicPr>
-        <p:blipFill>
-          <a:blip r:embed="rId3" cstate="print">
-            <a:duotone>
-              <a:schemeClr val="accent4">
-                <a:shade val="45000"/>
-                <a:satMod val="135000"/>
-              </a:schemeClr>
-              <a:prstClr val="white"/>
-            </a:duotone>
-            <a:extLst>
-              <a:ext uri="{28A0092B-C50C-407E-A947-70E740481C1C}">
-                <a14:useLocalDpi xmlns:a14="http://schemas.microsoft.com/office/drawing/2010/main" val="0"/>
-              </a:ext>
-            </a:extLst>
-          </a:blip>
-          <a:srcRect/>
-          <a:stretch>
-            <a:fillRect/>
-          </a:stretch>
-        </p:blipFill>
-        <p:spPr bwMode="auto">
-          <a:xfrm>
-            <a:off x="11402104" y="6483988"/>
-            <a:ext cx="320990" cy="320990"/>
-          </a:xfrm>
-          <a:prstGeom prst="rect">
-            <a:avLst/>
-          </a:prstGeom>
-          <a:noFill/>
-          <a:extLst>
-            <a:ext uri="{909E8E84-426E-40DD-AFC4-6F175D3DCCD1}">
-              <a14:hiddenFill xmlns:a14="http://schemas.microsoft.com/office/drawing/2010/main">
-                <a:solidFill>
-                  <a:srgbClr val="FFFFFF"/>
-                </a:solidFill>
-              </a14:hiddenFill>
-            </a:ext>
-          </a:extLst>
-        </p:spPr>
-      </p:pic>
       <p:sp>
         <p:nvSpPr>
           <p:cNvPr id="19" name="Retângulo 18">
@@ -14034,6 +13987,17 @@
 </file>
 
 <file path=customXml/item2.xml><?xml version="1.0" encoding="utf-8"?>
+<p:properties xmlns:p="http://schemas.microsoft.com/office/2006/metadata/properties" xmlns:xsi="http://www.w3.org/2001/XMLSchema-instance" xmlns:pc="http://schemas.microsoft.com/office/infopath/2007/PartnerControls">
+  <documentManagement>
+    <lcf76f155ced4ddcb4097134ff3c332f xmlns="8d73c667-0e32-466c-9097-a1f484c201cc">
+      <Terms xmlns="http://schemas.microsoft.com/office/infopath/2007/PartnerControls"/>
+    </lcf76f155ced4ddcb4097134ff3c332f>
+    <TaxCatchAll xmlns="110b98c3-9565-49b4-9c49-1e89583ef82c" xsi:nil="true"/>
+  </documentManagement>
+</p:properties>
+</file>
+
+<file path=customXml/item3.xml><?xml version="1.0" encoding="utf-8"?>
 <ct:contentTypeSchema xmlns:ct="http://schemas.microsoft.com/office/2006/metadata/contentType" xmlns:ma="http://schemas.microsoft.com/office/2006/metadata/properties/metaAttributes" ct:_="" ma:_="" ma:contentTypeName="Documento" ma:contentTypeID="0x010100A0731E8D1374834C8E89AE093B47FB16" ma:contentTypeVersion="16" ma:contentTypeDescription="Crie um novo documento." ma:contentTypeScope="" ma:versionID="e4c433fbe4644b2cc28dadbc7459ce97">
   <xsd:schema xmlns:xsd="http://www.w3.org/2001/XMLSchema" xmlns:xs="http://www.w3.org/2001/XMLSchema" xmlns:p="http://schemas.microsoft.com/office/2006/metadata/properties" xmlns:ns2="8d73c667-0e32-466c-9097-a1f484c201cc" xmlns:ns3="110b98c3-9565-49b4-9c49-1e89583ef82c" targetNamespace="http://schemas.microsoft.com/office/2006/metadata/properties" ma:root="true" ma:fieldsID="ba7ee87c8ad9b6b851da249f1730b17a" ns2:_="" ns3:_="">
     <xsd:import namespace="8d73c667-0e32-466c-9097-a1f484c201cc"/>
@@ -14276,17 +14240,6 @@
 </ct:contentTypeSchema>
 </file>
 
-<file path=customXml/item3.xml><?xml version="1.0" encoding="utf-8"?>
-<p:properties xmlns:p="http://schemas.microsoft.com/office/2006/metadata/properties" xmlns:xsi="http://www.w3.org/2001/XMLSchema-instance" xmlns:pc="http://schemas.microsoft.com/office/infopath/2007/PartnerControls">
-  <documentManagement>
-    <lcf76f155ced4ddcb4097134ff3c332f xmlns="8d73c667-0e32-466c-9097-a1f484c201cc">
-      <Terms xmlns="http://schemas.microsoft.com/office/infopath/2007/PartnerControls"/>
-    </lcf76f155ced4ddcb4097134ff3c332f>
-    <TaxCatchAll xmlns="110b98c3-9565-49b4-9c49-1e89583ef82c" xsi:nil="true"/>
-  </documentManagement>
-</p:properties>
-</file>
-
 <file path=customXml/itemProps1.xml><?xml version="1.0" encoding="utf-8"?>
 <ds:datastoreItem xmlns:ds="http://schemas.openxmlformats.org/officeDocument/2006/customXml" ds:itemID="{7B7E5500-1E1C-4DD3-A9B7-CDF199E77632}">
   <ds:schemaRefs>
@@ -14296,6 +14249,23 @@
 </file>
 
 <file path=customXml/itemProps2.xml><?xml version="1.0" encoding="utf-8"?>
+<ds:datastoreItem xmlns:ds="http://schemas.openxmlformats.org/officeDocument/2006/customXml" ds:itemID="{8C6D5030-9AA2-4901-9903-314081232E77}">
+  <ds:schemaRefs>
+    <ds:schemaRef ds:uri="http://schemas.microsoft.com/office/2006/documentManagement/types"/>
+    <ds:schemaRef ds:uri="http://purl.org/dc/elements/1.1/"/>
+    <ds:schemaRef ds:uri="http://schemas.openxmlformats.org/package/2006/metadata/core-properties"/>
+    <ds:schemaRef ds:uri="http://www.w3.org/XML/1998/namespace"/>
+    <ds:schemaRef ds:uri="http://purl.org/dc/dcmitype/"/>
+    <ds:schemaRef ds:uri="8d73c667-0e32-466c-9097-a1f484c201cc"/>
+    <ds:schemaRef ds:uri="http://schemas.microsoft.com/office/infopath/2007/PartnerControls"/>
+    <ds:schemaRef ds:uri="http://schemas.microsoft.com/office/2006/metadata/properties"/>
+    <ds:schemaRef ds:uri="http://purl.org/dc/terms/"/>
+    <ds:schemaRef ds:uri="110b98c3-9565-49b4-9c49-1e89583ef82c"/>
+  </ds:schemaRefs>
+</ds:datastoreItem>
+</file>
+
+<file path=customXml/itemProps3.xml><?xml version="1.0" encoding="utf-8"?>
 <ds:datastoreItem xmlns:ds="http://schemas.openxmlformats.org/officeDocument/2006/customXml" ds:itemID="{2588BDC5-2047-4356-B138-D278C7FFB0D5}">
   <ds:schemaRefs>
     <ds:schemaRef ds:uri="http://schemas.microsoft.com/office/2006/metadata/contentType"/>
@@ -14312,21 +14282,4 @@
     <ds:schemaRef ds:uri="http://schemas.microsoft.com/internal/obd"/>
   </ds:schemaRefs>
 </ds:datastoreItem>
-</file>
-
-<file path=customXml/itemProps3.xml><?xml version="1.0" encoding="utf-8"?>
-<ds:datastoreItem xmlns:ds="http://schemas.openxmlformats.org/officeDocument/2006/customXml" ds:itemID="{8C6D5030-9AA2-4901-9903-314081232E77}">
-  <ds:schemaRefs>
-    <ds:schemaRef ds:uri="http://schemas.microsoft.com/office/2006/documentManagement/types"/>
-    <ds:schemaRef ds:uri="http://purl.org/dc/elements/1.1/"/>
-    <ds:schemaRef ds:uri="http://schemas.openxmlformats.org/package/2006/metadata/core-properties"/>
-    <ds:schemaRef ds:uri="http://www.w3.org/XML/1998/namespace"/>
-    <ds:schemaRef ds:uri="http://purl.org/dc/dcmitype/"/>
-    <ds:schemaRef ds:uri="8d73c667-0e32-466c-9097-a1f484c201cc"/>
-    <ds:schemaRef ds:uri="http://schemas.microsoft.com/office/infopath/2007/PartnerControls"/>
-    <ds:schemaRef ds:uri="http://schemas.microsoft.com/office/2006/metadata/properties"/>
-    <ds:schemaRef ds:uri="http://purl.org/dc/terms/"/>
-    <ds:schemaRef ds:uri="110b98c3-9565-49b4-9c49-1e89583ef82c"/>
-  </ds:schemaRefs>
-</ds:datastoreItem>
 </file>
</xml_diff>

<commit_message>
Exportando o slide em pdf para entrega
</commit_message>
<xml_diff>
--- a/20250205_LicoesAprendidas/Grupo4_LicoesAprendidas.pptx
+++ b/20250205_LicoesAprendidas/Grupo4_LicoesAprendidas.pptx
@@ -691,7 +691,7 @@
           <a:p>
             <a:fld id="{59DFAF6B-3E96-4408-B623-B0A75E7457D9}" type="datetimeFigureOut">
               <a:rPr lang="en-US" smtClean="0"/>
-              <a:t>2/5/2025</a:t>
+              <a:t>2/9/2025</a:t>
             </a:fld>
             <a:endParaRPr lang="en-US"/>
           </a:p>
@@ -12586,7 +12586,7 @@
         <p:spPr>
           <a:xfrm>
             <a:off x="10607582" y="1704581"/>
-            <a:ext cx="1115512" cy="580779"/>
+            <a:ext cx="1292732" cy="580779"/>
           </a:xfrm>
           <a:prstGeom prst="rect">
             <a:avLst/>
@@ -12635,7 +12635,7 @@
                 <a:latin typeface="MV Boli" panose="02000500030200090000" pitchFamily="2" charset="0"/>
                 <a:cs typeface="MV Boli" panose="02000500030200090000" pitchFamily="2" charset="0"/>
               </a:rPr>
-              <a:t>Ouvir e ter a mente aberta</a:t>
+              <a:t>Ouvir e manter a mente aberta</a:t>
             </a:r>
           </a:p>
         </p:txBody>
@@ -13987,17 +13987,6 @@
 </file>
 
 <file path=customXml/item2.xml><?xml version="1.0" encoding="utf-8"?>
-<p:properties xmlns:p="http://schemas.microsoft.com/office/2006/metadata/properties" xmlns:xsi="http://www.w3.org/2001/XMLSchema-instance" xmlns:pc="http://schemas.microsoft.com/office/infopath/2007/PartnerControls">
-  <documentManagement>
-    <lcf76f155ced4ddcb4097134ff3c332f xmlns="8d73c667-0e32-466c-9097-a1f484c201cc">
-      <Terms xmlns="http://schemas.microsoft.com/office/infopath/2007/PartnerControls"/>
-    </lcf76f155ced4ddcb4097134ff3c332f>
-    <TaxCatchAll xmlns="110b98c3-9565-49b4-9c49-1e89583ef82c" xsi:nil="true"/>
-  </documentManagement>
-</p:properties>
-</file>
-
-<file path=customXml/item3.xml><?xml version="1.0" encoding="utf-8"?>
 <ct:contentTypeSchema xmlns:ct="http://schemas.microsoft.com/office/2006/metadata/contentType" xmlns:ma="http://schemas.microsoft.com/office/2006/metadata/properties/metaAttributes" ct:_="" ma:_="" ma:contentTypeName="Documento" ma:contentTypeID="0x010100A0731E8D1374834C8E89AE093B47FB16" ma:contentTypeVersion="16" ma:contentTypeDescription="Crie um novo documento." ma:contentTypeScope="" ma:versionID="e4c433fbe4644b2cc28dadbc7459ce97">
   <xsd:schema xmlns:xsd="http://www.w3.org/2001/XMLSchema" xmlns:xs="http://www.w3.org/2001/XMLSchema" xmlns:p="http://schemas.microsoft.com/office/2006/metadata/properties" xmlns:ns2="8d73c667-0e32-466c-9097-a1f484c201cc" xmlns:ns3="110b98c3-9565-49b4-9c49-1e89583ef82c" targetNamespace="http://schemas.microsoft.com/office/2006/metadata/properties" ma:root="true" ma:fieldsID="ba7ee87c8ad9b6b851da249f1730b17a" ns2:_="" ns3:_="">
     <xsd:import namespace="8d73c667-0e32-466c-9097-a1f484c201cc"/>
@@ -14240,6 +14229,17 @@
 </ct:contentTypeSchema>
 </file>
 
+<file path=customXml/item3.xml><?xml version="1.0" encoding="utf-8"?>
+<p:properties xmlns:p="http://schemas.microsoft.com/office/2006/metadata/properties" xmlns:xsi="http://www.w3.org/2001/XMLSchema-instance" xmlns:pc="http://schemas.microsoft.com/office/infopath/2007/PartnerControls">
+  <documentManagement>
+    <lcf76f155ced4ddcb4097134ff3c332f xmlns="8d73c667-0e32-466c-9097-a1f484c201cc">
+      <Terms xmlns="http://schemas.microsoft.com/office/infopath/2007/PartnerControls"/>
+    </lcf76f155ced4ddcb4097134ff3c332f>
+    <TaxCatchAll xmlns="110b98c3-9565-49b4-9c49-1e89583ef82c" xsi:nil="true"/>
+  </documentManagement>
+</p:properties>
+</file>
+
 <file path=customXml/itemProps1.xml><?xml version="1.0" encoding="utf-8"?>
 <ds:datastoreItem xmlns:ds="http://schemas.openxmlformats.org/officeDocument/2006/customXml" ds:itemID="{7B7E5500-1E1C-4DD3-A9B7-CDF199E77632}">
   <ds:schemaRefs>
@@ -14249,23 +14249,6 @@
 </file>
 
 <file path=customXml/itemProps2.xml><?xml version="1.0" encoding="utf-8"?>
-<ds:datastoreItem xmlns:ds="http://schemas.openxmlformats.org/officeDocument/2006/customXml" ds:itemID="{8C6D5030-9AA2-4901-9903-314081232E77}">
-  <ds:schemaRefs>
-    <ds:schemaRef ds:uri="http://schemas.microsoft.com/office/2006/documentManagement/types"/>
-    <ds:schemaRef ds:uri="http://purl.org/dc/elements/1.1/"/>
-    <ds:schemaRef ds:uri="http://schemas.openxmlformats.org/package/2006/metadata/core-properties"/>
-    <ds:schemaRef ds:uri="http://www.w3.org/XML/1998/namespace"/>
-    <ds:schemaRef ds:uri="http://purl.org/dc/dcmitype/"/>
-    <ds:schemaRef ds:uri="8d73c667-0e32-466c-9097-a1f484c201cc"/>
-    <ds:schemaRef ds:uri="http://schemas.microsoft.com/office/infopath/2007/PartnerControls"/>
-    <ds:schemaRef ds:uri="http://schemas.microsoft.com/office/2006/metadata/properties"/>
-    <ds:schemaRef ds:uri="http://purl.org/dc/terms/"/>
-    <ds:schemaRef ds:uri="110b98c3-9565-49b4-9c49-1e89583ef82c"/>
-  </ds:schemaRefs>
-</ds:datastoreItem>
-</file>
-
-<file path=customXml/itemProps3.xml><?xml version="1.0" encoding="utf-8"?>
 <ds:datastoreItem xmlns:ds="http://schemas.openxmlformats.org/officeDocument/2006/customXml" ds:itemID="{2588BDC5-2047-4356-B138-D278C7FFB0D5}">
   <ds:schemaRefs>
     <ds:schemaRef ds:uri="http://schemas.microsoft.com/office/2006/metadata/contentType"/>
@@ -14282,4 +14265,21 @@
     <ds:schemaRef ds:uri="http://schemas.microsoft.com/internal/obd"/>
   </ds:schemaRefs>
 </ds:datastoreItem>
+</file>
+
+<file path=customXml/itemProps3.xml><?xml version="1.0" encoding="utf-8"?>
+<ds:datastoreItem xmlns:ds="http://schemas.openxmlformats.org/officeDocument/2006/customXml" ds:itemID="{8C6D5030-9AA2-4901-9903-314081232E77}">
+  <ds:schemaRefs>
+    <ds:schemaRef ds:uri="http://schemas.openxmlformats.org/package/2006/metadata/core-properties"/>
+    <ds:schemaRef ds:uri="http://purl.org/dc/dcmitype/"/>
+    <ds:schemaRef ds:uri="8d73c667-0e32-466c-9097-a1f484c201cc"/>
+    <ds:schemaRef ds:uri="http://purl.org/dc/elements/1.1/"/>
+    <ds:schemaRef ds:uri="http://schemas.microsoft.com/office/infopath/2007/PartnerControls"/>
+    <ds:schemaRef ds:uri="http://purl.org/dc/terms/"/>
+    <ds:schemaRef ds:uri="http://schemas.microsoft.com/office/2006/documentManagement/types"/>
+    <ds:schemaRef ds:uri="110b98c3-9565-49b4-9c49-1e89583ef82c"/>
+    <ds:schemaRef ds:uri="http://schemas.microsoft.com/office/2006/metadata/properties"/>
+    <ds:schemaRef ds:uri="http://www.w3.org/XML/1998/namespace"/>
+  </ds:schemaRefs>
+</ds:datastoreItem>
 </file>
</xml_diff>